<commit_message>
Update files after class.
</commit_message>
<xml_diff>
--- a/CPSC-24700/Presentations/session-13.pptx
+++ b/CPSC-24700/Presentations/session-13.pptx
@@ -4261,7 +4261,7 @@
             </a:br>
             <a:r>
               <a:rPr lang="en-US" sz="1800" dirty="0"/>
-              <a:t>Session: 12</a:t>
+              <a:t>Session: 13</a:t>
             </a:r>
           </a:p>
         </p:txBody>
@@ -4358,19 +4358,6 @@
               <a:rPr lang="en-US" sz="2000" dirty="0"/>
               <a:t>Discussion &amp; Questions welcome at any time… please be present with no phones or email during our discussion time</a:t>
             </a:r>
-          </a:p>
-          <a:p>
-            <a:pPr marL="0" indent="0">
-              <a:buNone/>
-            </a:pPr>
-            <a:endParaRPr lang="en-US" sz="2000" dirty="0"/>
-          </a:p>
-          <a:p>
-            <a:pPr marL="457200" indent="-457200">
-              <a:buFont typeface="+mj-lt"/>
-              <a:buAutoNum type="arabicPeriod"/>
-            </a:pPr>
-            <a:endParaRPr lang="en-US" sz="2000" dirty="0"/>
           </a:p>
           <a:p>
             <a:pPr marL="457200" indent="-457200">

</xml_diff>

<commit_message>
Update session 26 documents (late).
</commit_message>
<xml_diff>
--- a/CPSC-24700/Presentations/session-13.pptx
+++ b/CPSC-24700/Presentations/session-13.pptx
@@ -206,7 +206,7 @@
           <a:p>
             <a:fld id="{1CF91C02-A59E-4778-8D4F-4840DBBEFA68}" type="datetimeFigureOut">
               <a:rPr lang="en-US" smtClean="0"/>
-              <a:t>9/27/2017</a:t>
+              <a:t>10/30/2017</a:t>
             </a:fld>
             <a:endParaRPr lang="en-US"/>
           </a:p>
@@ -1150,7 +1150,7 @@
           <a:p>
             <a:fld id="{5FB62F81-FD80-4AA8-93CA-E835B40BE667}" type="datetimeFigureOut">
               <a:rPr lang="en-US" smtClean="0"/>
-              <a:t>9/27/2017</a:t>
+              <a:t>10/30/2017</a:t>
             </a:fld>
             <a:endParaRPr lang="en-US"/>
           </a:p>
@@ -1348,7 +1348,7 @@
           <a:p>
             <a:fld id="{5FB62F81-FD80-4AA8-93CA-E835B40BE667}" type="datetimeFigureOut">
               <a:rPr lang="en-US" smtClean="0"/>
-              <a:t>9/27/2017</a:t>
+              <a:t>10/30/2017</a:t>
             </a:fld>
             <a:endParaRPr lang="en-US"/>
           </a:p>
@@ -1556,7 +1556,7 @@
           <a:p>
             <a:fld id="{5FB62F81-FD80-4AA8-93CA-E835B40BE667}" type="datetimeFigureOut">
               <a:rPr lang="en-US" smtClean="0"/>
-              <a:t>9/27/2017</a:t>
+              <a:t>10/30/2017</a:t>
             </a:fld>
             <a:endParaRPr lang="en-US"/>
           </a:p>
@@ -1754,7 +1754,7 @@
           <a:p>
             <a:fld id="{5FB62F81-FD80-4AA8-93CA-E835B40BE667}" type="datetimeFigureOut">
               <a:rPr lang="en-US" smtClean="0"/>
-              <a:t>9/27/2017</a:t>
+              <a:t>10/30/2017</a:t>
             </a:fld>
             <a:endParaRPr lang="en-US"/>
           </a:p>
@@ -2029,7 +2029,7 @@
           <a:p>
             <a:fld id="{5FB62F81-FD80-4AA8-93CA-E835B40BE667}" type="datetimeFigureOut">
               <a:rPr lang="en-US" smtClean="0"/>
-              <a:t>9/27/2017</a:t>
+              <a:t>10/30/2017</a:t>
             </a:fld>
             <a:endParaRPr lang="en-US"/>
           </a:p>
@@ -2294,7 +2294,7 @@
           <a:p>
             <a:fld id="{5FB62F81-FD80-4AA8-93CA-E835B40BE667}" type="datetimeFigureOut">
               <a:rPr lang="en-US" smtClean="0"/>
-              <a:t>9/27/2017</a:t>
+              <a:t>10/30/2017</a:t>
             </a:fld>
             <a:endParaRPr lang="en-US"/>
           </a:p>
@@ -2706,7 +2706,7 @@
           <a:p>
             <a:fld id="{5FB62F81-FD80-4AA8-93CA-E835B40BE667}" type="datetimeFigureOut">
               <a:rPr lang="en-US" smtClean="0"/>
-              <a:t>9/27/2017</a:t>
+              <a:t>10/30/2017</a:t>
             </a:fld>
             <a:endParaRPr lang="en-US"/>
           </a:p>
@@ -2847,7 +2847,7 @@
           <a:p>
             <a:fld id="{5FB62F81-FD80-4AA8-93CA-E835B40BE667}" type="datetimeFigureOut">
               <a:rPr lang="en-US" smtClean="0"/>
-              <a:t>9/27/2017</a:t>
+              <a:t>10/30/2017</a:t>
             </a:fld>
             <a:endParaRPr lang="en-US"/>
           </a:p>
@@ -2960,7 +2960,7 @@
           <a:p>
             <a:fld id="{5FB62F81-FD80-4AA8-93CA-E835B40BE667}" type="datetimeFigureOut">
               <a:rPr lang="en-US" smtClean="0"/>
-              <a:t>9/27/2017</a:t>
+              <a:t>10/30/2017</a:t>
             </a:fld>
             <a:endParaRPr lang="en-US"/>
           </a:p>
@@ -3271,7 +3271,7 @@
           <a:p>
             <a:fld id="{5FB62F81-FD80-4AA8-93CA-E835B40BE667}" type="datetimeFigureOut">
               <a:rPr lang="en-US" smtClean="0"/>
-              <a:t>9/27/2017</a:t>
+              <a:t>10/30/2017</a:t>
             </a:fld>
             <a:endParaRPr lang="en-US"/>
           </a:p>
@@ -3559,7 +3559,7 @@
           <a:p>
             <a:fld id="{5FB62F81-FD80-4AA8-93CA-E835B40BE667}" type="datetimeFigureOut">
               <a:rPr lang="en-US" smtClean="0"/>
-              <a:t>9/27/2017</a:t>
+              <a:t>10/30/2017</a:t>
             </a:fld>
             <a:endParaRPr lang="en-US"/>
           </a:p>
@@ -3800,7 +3800,7 @@
           <a:p>
             <a:fld id="{5FB62F81-FD80-4AA8-93CA-E835B40BE667}" type="datetimeFigureOut">
               <a:rPr lang="en-US" smtClean="0"/>
-              <a:t>9/27/2017</a:t>
+              <a:t>10/30/2017</a:t>
             </a:fld>
             <a:endParaRPr lang="en-US"/>
           </a:p>
@@ -4543,15 +4543,7 @@
           <a:p>
             <a:r>
               <a:rPr lang="en-US" sz="2000" dirty="0"/>
-              <a:t>Please do: Listen, learn, ask knowledgeable questions, provide sincere positive feedback, and always show your appreciation by </a:t>
-            </a:r>
-            <a:r>
-              <a:rPr lang="en-US" sz="2000" dirty="0" err="1"/>
-              <a:t>claping</a:t>
-            </a:r>
-            <a:r>
-              <a:rPr lang="en-US" sz="2000" dirty="0"/>
-              <a:t> at the end</a:t>
+              <a:t>Please do: Listen, learn, ask knowledgeable questions, provide sincere positive feedback, and always show your appreciation by clapping at the end</a:t>
             </a:r>
           </a:p>
           <a:p>

</xml_diff>